<commit_message>
Update Predicting Stock Levels using AI and Machine Learning.pptx
</commit_message>
<xml_diff>
--- a/Task3/Predicting Stock Levels using AI and Machine Learning.pptx
+++ b/Task3/Predicting Stock Levels using AI and Machine Learning.pptx
@@ -4041,7 +4041,7 @@
           <a:p>
             <a:fld id="{AF869721-F543-4A6C-BF9D-65D7CC540427}" type="datetimeFigureOut">
               <a:rPr lang="en-US" smtClean="0"/>
-              <a:t>7/30/2023</a:t>
+              <a:t>10/2/2024</a:t>
             </a:fld>
             <a:endParaRPr lang="en-US" dirty="0"/>
           </a:p>
@@ -4218,7 +4218,7 @@
           <a:p>
             <a:fld id="{C732326A-4C88-4AFB-AA5B-5919D81DFF5B}" type="datetimeFigureOut">
               <a:rPr lang="en-US" smtClean="0"/>
-              <a:t>7/30/2023</a:t>
+              <a:t>10/2/2024</a:t>
             </a:fld>
             <a:endParaRPr lang="en-US" dirty="0"/>
           </a:p>
@@ -4731,7 +4731,7 @@
             <a:fld id="{B61BEF0D-F0BB-DE4B-95CE-6DB70DBA9567}" type="datetimeFigureOut">
               <a:rPr lang="en-US" smtClean="0"/>
               <a:pPr/>
-              <a:t>7/30/2023</a:t>
+              <a:t>10/2/2024</a:t>
             </a:fld>
             <a:endParaRPr lang="en-US" dirty="0"/>
           </a:p>
@@ -4995,7 +4995,7 @@
             <a:fld id="{B61BEF0D-F0BB-DE4B-95CE-6DB70DBA9567}" type="datetimeFigureOut">
               <a:rPr lang="en-US" smtClean="0"/>
               <a:pPr/>
-              <a:t>7/30/2023</a:t>
+              <a:t>10/2/2024</a:t>
             </a:fld>
             <a:endParaRPr lang="en-US" dirty="0"/>
           </a:p>
@@ -5232,7 +5232,7 @@
             <a:fld id="{B61BEF0D-F0BB-DE4B-95CE-6DB70DBA9567}" type="datetimeFigureOut">
               <a:rPr lang="en-US" smtClean="0"/>
               <a:pPr/>
-              <a:t>7/30/2023</a:t>
+              <a:t>10/2/2024</a:t>
             </a:fld>
             <a:endParaRPr lang="en-US" dirty="0"/>
           </a:p>
@@ -5474,7 +5474,7 @@
             <a:fld id="{B61BEF0D-F0BB-DE4B-95CE-6DB70DBA9567}" type="datetimeFigureOut">
               <a:rPr lang="en-US" smtClean="0"/>
               <a:pPr/>
-              <a:t>7/30/2023</a:t>
+              <a:t>10/2/2024</a:t>
             </a:fld>
             <a:endParaRPr lang="en-US" dirty="0"/>
           </a:p>
@@ -5783,7 +5783,7 @@
             <a:fld id="{B61BEF0D-F0BB-DE4B-95CE-6DB70DBA9567}" type="datetimeFigureOut">
               <a:rPr lang="en-US" smtClean="0"/>
               <a:pPr/>
-              <a:t>7/30/2023</a:t>
+              <a:t>10/2/2024</a:t>
             </a:fld>
             <a:endParaRPr lang="en-US" dirty="0"/>
           </a:p>
@@ -6087,7 +6087,7 @@
             <a:fld id="{B61BEF0D-F0BB-DE4B-95CE-6DB70DBA9567}" type="datetimeFigureOut">
               <a:rPr lang="en-US" smtClean="0"/>
               <a:pPr/>
-              <a:t>7/30/2023</a:t>
+              <a:t>10/2/2024</a:t>
             </a:fld>
             <a:endParaRPr lang="en-US" dirty="0"/>
           </a:p>
@@ -6511,7 +6511,7 @@
             <a:fld id="{B61BEF0D-F0BB-DE4B-95CE-6DB70DBA9567}" type="datetimeFigureOut">
               <a:rPr lang="en-US" smtClean="0"/>
               <a:pPr/>
-              <a:t>7/30/2023</a:t>
+              <a:t>10/2/2024</a:t>
             </a:fld>
             <a:endParaRPr lang="en-US" dirty="0"/>
           </a:p>
@@ -6608,7 +6608,7 @@
             <a:fld id="{B61BEF0D-F0BB-DE4B-95CE-6DB70DBA9567}" type="datetimeFigureOut">
               <a:rPr lang="en-US" smtClean="0"/>
               <a:pPr/>
-              <a:t>7/30/2023</a:t>
+              <a:t>10/2/2024</a:t>
             </a:fld>
             <a:endParaRPr lang="en-US" dirty="0"/>
           </a:p>
@@ -6772,7 +6772,7 @@
             <a:fld id="{B61BEF0D-F0BB-DE4B-95CE-6DB70DBA9567}" type="datetimeFigureOut">
               <a:rPr lang="en-US" smtClean="0"/>
               <a:pPr/>
-              <a:t>7/30/2023</a:t>
+              <a:t>10/2/2024</a:t>
             </a:fld>
             <a:endParaRPr lang="en-US" dirty="0"/>
           </a:p>
@@ -7152,7 +7152,7 @@
             <a:fld id="{B61BEF0D-F0BB-DE4B-95CE-6DB70DBA9567}" type="datetimeFigureOut">
               <a:rPr lang="en-US" smtClean="0"/>
               <a:pPr/>
-              <a:t>7/30/2023</a:t>
+              <a:t>10/2/2024</a:t>
             </a:fld>
             <a:endParaRPr lang="en-US" dirty="0"/>
           </a:p>
@@ -7443,7 +7443,7 @@
             <a:fld id="{B61BEF0D-F0BB-DE4B-95CE-6DB70DBA9567}" type="datetimeFigureOut">
               <a:rPr lang="en-US" smtClean="0"/>
               <a:pPr/>
-              <a:t>7/30/2023</a:t>
+              <a:t>10/2/2024</a:t>
             </a:fld>
             <a:endParaRPr lang="en-US" dirty="0"/>
           </a:p>
@@ -7656,7 +7656,7 @@
             <a:fld id="{B61BEF0D-F0BB-DE4B-95CE-6DB70DBA9567}" type="datetimeFigureOut">
               <a:rPr lang="en-US" smtClean="0"/>
               <a:pPr/>
-              <a:t>7/30/2023</a:t>
+              <a:t>10/2/2024</a:t>
             </a:fld>
             <a:endParaRPr lang="en-US" dirty="0"/>
           </a:p>

</xml_diff>